<commit_message>
충동 해결 non fast-forward
</commit_message>
<xml_diff>
--- a/GA1-Introduction.pptx
+++ b/GA1-Introduction.pptx
@@ -3562,14 +3562,7 @@
                 <a:latin typeface="Adobe Fan Heiti Std B" pitchFamily="34" charset="-128"/>
                 <a:ea typeface="Adobe Fan Heiti Std B" pitchFamily="34" charset="-128"/>
               </a:rPr>
-              <a:t>Introduction </a:t>
-            </a:r>
-            <a:r>
-              <a:rPr lang="en-US" altLang="ko-KR" sz="4000" smtClean="0">
-                <a:latin typeface="Adobe Fan Heiti Std B" pitchFamily="34" charset="-128"/>
-                <a:ea typeface="Adobe Fan Heiti Std B" pitchFamily="34" charset="-128"/>
-              </a:rPr>
-              <a:t>*</a:t>
+              <a:t>Introduction *</a:t>
             </a:r>
             <a:endParaRPr lang="ko-KR" altLang="en-US" dirty="0">
               <a:latin typeface="Adobe Fan Heiti Std B" pitchFamily="34" charset="-128"/>
@@ -4612,6 +4605,13 @@
   <p:clrMapOvr>
     <a:masterClrMapping/>
   </p:clrMapOvr>
+  <p:timing>
+    <p:tnLst>
+      <p:par>
+        <p:cTn id="1" dur="indefinite" restart="never" nodeType="tmRoot"/>
+      </p:par>
+    </p:tnLst>
+  </p:timing>
 </p:sld>
 </file>
 
@@ -4745,6 +4745,9 @@
             </a:r>
             <a:r>
               <a:rPr lang="en-US" altLang="ko-KR" sz="2400" b="1" dirty="0" smtClean="0">
+                <a:solidFill>
+                  <a:srgbClr val="0066FF"/>
+                </a:solidFill>
                 <a:latin typeface="Cambria Math" panose="02040503050406030204" pitchFamily="18" charset="0"/>
                 <a:ea typeface="Cambria Math" panose="02040503050406030204" pitchFamily="18" charset="0"/>
               </a:rPr>
@@ -4752,6 +4755,9 @@
             </a:r>
             <a:r>
               <a:rPr lang="en-US" altLang="ko-KR" sz="2400" dirty="0" smtClean="0">
+                <a:solidFill>
+                  <a:srgbClr val="0066FF"/>
+                </a:solidFill>
                 <a:latin typeface="Cambria Math" panose="02040503050406030204" pitchFamily="18" charset="0"/>
                 <a:ea typeface="Cambria Math" panose="02040503050406030204" pitchFamily="18" charset="0"/>
               </a:rPr>
@@ -4812,6 +4818,13 @@
   <p:clrMapOvr>
     <a:masterClrMapping/>
   </p:clrMapOvr>
+  <p:timing>
+    <p:tnLst>
+      <p:par>
+        <p:cTn id="1" dur="indefinite" restart="never" nodeType="tmRoot"/>
+      </p:par>
+    </p:tnLst>
+  </p:timing>
 </p:sld>
 </file>
 

</xml_diff>